<commit_message>
cross matrix figure updates
</commit_message>
<xml_diff>
--- a/pptx/glinski_bee_matrices.pptx
+++ b/pptx/glinski_bee_matrices.pptx
@@ -6,8 +6,11 @@
   </p:sldMasterIdLst>
   <p:sldIdLst>
     <p:sldId id="256" r:id="rId2"/>
-    <p:sldId id="257" r:id="rId3"/>
-    <p:sldId id="258" r:id="rId4"/>
+    <p:sldId id="259" r:id="rId3"/>
+    <p:sldId id="261" r:id="rId4"/>
+    <p:sldId id="260" r:id="rId5"/>
+    <p:sldId id="262" r:id="rId6"/>
+    <p:sldId id="263" r:id="rId7"/>
   </p:sldIdLst>
   <p:sldSz cx="12192000" cy="6858000"/>
   <p:notesSz cx="6858000" cy="9144000"/>
@@ -106,6 +109,11 @@
       </a:defRPr>
     </a:lvl9pPr>
   </p:defaultTextStyle>
+  <p:extLst>
+    <p:ext uri="{EFAFB233-063F-42B5-8137-9DF3F51BA10A}">
+      <p15:sldGuideLst xmlns:p15="http://schemas.microsoft.com/office/powerpoint/2012/main"/>
+    </p:ext>
+  </p:extLst>
 </p:presentation>
 </file>
 
@@ -256,7 +264,7 @@
           <a:p>
             <a:fld id="{EABB898F-4C09-408E-8555-5949496D4208}" type="datetimeFigureOut">
               <a:rPr lang="en-US" smtClean="0"/>
-              <a:t>3/13/2023</a:t>
+              <a:t>3/30/2023</a:t>
             </a:fld>
             <a:endParaRPr lang="en-US"/>
           </a:p>
@@ -454,7 +462,7 @@
           <a:p>
             <a:fld id="{EABB898F-4C09-408E-8555-5949496D4208}" type="datetimeFigureOut">
               <a:rPr lang="en-US" smtClean="0"/>
-              <a:t>3/13/2023</a:t>
+              <a:t>3/30/2023</a:t>
             </a:fld>
             <a:endParaRPr lang="en-US"/>
           </a:p>
@@ -662,7 +670,7 @@
           <a:p>
             <a:fld id="{EABB898F-4C09-408E-8555-5949496D4208}" type="datetimeFigureOut">
               <a:rPr lang="en-US" smtClean="0"/>
-              <a:t>3/13/2023</a:t>
+              <a:t>3/30/2023</a:t>
             </a:fld>
             <a:endParaRPr lang="en-US"/>
           </a:p>
@@ -860,7 +868,7 @@
           <a:p>
             <a:fld id="{EABB898F-4C09-408E-8555-5949496D4208}" type="datetimeFigureOut">
               <a:rPr lang="en-US" smtClean="0"/>
-              <a:t>3/13/2023</a:t>
+              <a:t>3/30/2023</a:t>
             </a:fld>
             <a:endParaRPr lang="en-US"/>
           </a:p>
@@ -1135,7 +1143,7 @@
           <a:p>
             <a:fld id="{EABB898F-4C09-408E-8555-5949496D4208}" type="datetimeFigureOut">
               <a:rPr lang="en-US" smtClean="0"/>
-              <a:t>3/13/2023</a:t>
+              <a:t>3/30/2023</a:t>
             </a:fld>
             <a:endParaRPr lang="en-US"/>
           </a:p>
@@ -1400,7 +1408,7 @@
           <a:p>
             <a:fld id="{EABB898F-4C09-408E-8555-5949496D4208}" type="datetimeFigureOut">
               <a:rPr lang="en-US" smtClean="0"/>
-              <a:t>3/13/2023</a:t>
+              <a:t>3/30/2023</a:t>
             </a:fld>
             <a:endParaRPr lang="en-US"/>
           </a:p>
@@ -1812,7 +1820,7 @@
           <a:p>
             <a:fld id="{EABB898F-4C09-408E-8555-5949496D4208}" type="datetimeFigureOut">
               <a:rPr lang="en-US" smtClean="0"/>
-              <a:t>3/13/2023</a:t>
+              <a:t>3/30/2023</a:t>
             </a:fld>
             <a:endParaRPr lang="en-US"/>
           </a:p>
@@ -1953,7 +1961,7 @@
           <a:p>
             <a:fld id="{EABB898F-4C09-408E-8555-5949496D4208}" type="datetimeFigureOut">
               <a:rPr lang="en-US" smtClean="0"/>
-              <a:t>3/13/2023</a:t>
+              <a:t>3/30/2023</a:t>
             </a:fld>
             <a:endParaRPr lang="en-US"/>
           </a:p>
@@ -2066,7 +2074,7 @@
           <a:p>
             <a:fld id="{EABB898F-4C09-408E-8555-5949496D4208}" type="datetimeFigureOut">
               <a:rPr lang="en-US" smtClean="0"/>
-              <a:t>3/13/2023</a:t>
+              <a:t>3/30/2023</a:t>
             </a:fld>
             <a:endParaRPr lang="en-US"/>
           </a:p>
@@ -2377,7 +2385,7 @@
           <a:p>
             <a:fld id="{EABB898F-4C09-408E-8555-5949496D4208}" type="datetimeFigureOut">
               <a:rPr lang="en-US" smtClean="0"/>
-              <a:t>3/13/2023</a:t>
+              <a:t>3/30/2023</a:t>
             </a:fld>
             <a:endParaRPr lang="en-US"/>
           </a:p>
@@ -2665,7 +2673,7 @@
           <a:p>
             <a:fld id="{EABB898F-4C09-408E-8555-5949496D4208}" type="datetimeFigureOut">
               <a:rPr lang="en-US" smtClean="0"/>
-              <a:t>3/13/2023</a:t>
+              <a:t>3/30/2023</a:t>
             </a:fld>
             <a:endParaRPr lang="en-US"/>
           </a:p>
@@ -2906,7 +2914,7 @@
           <a:p>
             <a:fld id="{EABB898F-4C09-408E-8555-5949496D4208}" type="datetimeFigureOut">
               <a:rPr lang="en-US" smtClean="0"/>
-              <a:t>3/13/2023</a:t>
+              <a:t>3/30/2023</a:t>
             </a:fld>
             <a:endParaRPr lang="en-US"/>
           </a:p>
@@ -3407,12 +3415,55 @@
           <a:chExt cx="0" cy="0"/>
         </a:xfrm>
       </p:grpSpPr>
+      <p:sp>
+        <p:nvSpPr>
+          <p:cNvPr id="2" name="Title 1">
+            <a:extLst>
+              <a:ext uri="{FF2B5EF4-FFF2-40B4-BE49-F238E27FC236}">
+                <a16:creationId xmlns:a16="http://schemas.microsoft.com/office/drawing/2014/main" id="{8D0DAFD3-ACD4-7A96-80FB-C6CAE40234B6}"/>
+              </a:ext>
+            </a:extLst>
+          </p:cNvPr>
+          <p:cNvSpPr>
+            <a:spLocks noGrp="1"/>
+          </p:cNvSpPr>
+          <p:nvPr>
+            <p:ph type="title"/>
+          </p:nvPr>
+        </p:nvSpPr>
+        <p:spPr>
+          <a:xfrm>
+            <a:off x="412172" y="344343"/>
+            <a:ext cx="5028373" cy="4619543"/>
+          </a:xfrm>
+        </p:spPr>
+        <p:txBody>
+          <a:bodyPr>
+            <a:normAutofit/>
+          </a:bodyPr>
+          <a:lstStyle/>
+          <a:p>
+            <a:r>
+              <a:rPr lang="en-US" sz="1800" dirty="0"/>
+              <a:t>Figure X. Heatmap of mean logged chemical concentrations for the different measured matrices. Screening consists of keeping chemicals with greater that 10% detection frequency in 2 or more matrices. Low and high refer to agricultural cover in the vicinity… Matrix type is more influential than agricultural cover for clustering (columns). However, high ag has higher concs more often than not within a media type. The consistently cross-matrix chemical cluster (top 11 rows) are a number of </a:t>
+            </a:r>
+            <a:r>
+              <a:rPr lang="en-US" sz="1800" dirty="0" err="1"/>
+              <a:t>neonics</a:t>
+            </a:r>
+            <a:r>
+              <a:rPr lang="en-US" sz="1800" dirty="0"/>
+              <a:t> and …</a:t>
+            </a:r>
+          </a:p>
+        </p:txBody>
+      </p:sp>
       <p:pic>
         <p:nvPicPr>
-          <p:cNvPr id="5" name="Content Placeholder 4" descr="Chart&#10;&#10;Description automatically generated with low confidence">
-            <a:extLst>
-              <a:ext uri="{FF2B5EF4-FFF2-40B4-BE49-F238E27FC236}">
-                <a16:creationId xmlns:a16="http://schemas.microsoft.com/office/drawing/2014/main" id="{B7F61E01-3FBA-E1D7-1906-B1742437FF20}"/>
+          <p:cNvPr id="5" name="Content Placeholder 4" descr="Chart, box and whisker chart&#10;&#10;Description automatically generated">
+            <a:extLst>
+              <a:ext uri="{FF2B5EF4-FFF2-40B4-BE49-F238E27FC236}">
+                <a16:creationId xmlns:a16="http://schemas.microsoft.com/office/drawing/2014/main" id="{A26B7659-632B-7048-8F56-8F948941EBBB}"/>
               </a:ext>
             </a:extLst>
           </p:cNvPr>
@@ -3437,51 +3488,15 @@
         </p:blipFill>
         <p:spPr>
           <a:xfrm>
-            <a:off x="166460" y="65121"/>
-            <a:ext cx="3917167" cy="6855045"/>
+            <a:off x="5440546" y="0"/>
+            <a:ext cx="6629400" cy="6629400"/>
           </a:xfrm>
-        </p:spPr>
-      </p:pic>
-      <p:pic>
-        <p:nvPicPr>
-          <p:cNvPr id="7" name="Picture 6" descr="Chart, box and whisker chart&#10;&#10;Description automatically generated">
-            <a:extLst>
-              <a:ext uri="{FF2B5EF4-FFF2-40B4-BE49-F238E27FC236}">
-                <a16:creationId xmlns:a16="http://schemas.microsoft.com/office/drawing/2014/main" id="{4D7CBD9A-5D24-E556-4BEB-D5A319639F83}"/>
-              </a:ext>
-            </a:extLst>
-          </p:cNvPr>
-          <p:cNvPicPr>
-            <a:picLocks noChangeAspect="1"/>
-          </p:cNvPicPr>
-          <p:nvPr/>
-        </p:nvPicPr>
-        <p:blipFill>
-          <a:blip r:embed="rId3">
-            <a:extLst>
-              <a:ext uri="{28A0092B-C50C-407E-A947-70E740481C1C}">
-                <a14:useLocalDpi xmlns:a14="http://schemas.microsoft.com/office/drawing/2010/main" val="0"/>
-              </a:ext>
-            </a:extLst>
-          </a:blip>
-          <a:stretch>
-            <a:fillRect/>
-          </a:stretch>
-        </p:blipFill>
-        <p:spPr>
-          <a:xfrm>
-            <a:off x="4862945" y="0"/>
-            <a:ext cx="6927274" cy="6927274"/>
-          </a:xfrm>
-          <a:prstGeom prst="rect">
-            <a:avLst/>
-          </a:prstGeom>
         </p:spPr>
       </p:pic>
     </p:spTree>
     <p:extLst>
       <p:ext uri="{BB962C8B-B14F-4D97-AF65-F5344CB8AC3E}">
-        <p14:creationId xmlns:p14="http://schemas.microsoft.com/office/powerpoint/2010/main" val="4128773681"/>
+        <p14:creationId xmlns:p14="http://schemas.microsoft.com/office/powerpoint/2010/main" val="1376304758"/>
       </p:ext>
     </p:extLst>
   </p:cSld>
@@ -3508,19 +3523,139 @@
           <a:chExt cx="0" cy="0"/>
         </a:xfrm>
       </p:grpSpPr>
+      <p:sp>
+        <p:nvSpPr>
+          <p:cNvPr id="2" name="Title 1">
+            <a:extLst>
+              <a:ext uri="{FF2B5EF4-FFF2-40B4-BE49-F238E27FC236}">
+                <a16:creationId xmlns:a16="http://schemas.microsoft.com/office/drawing/2014/main" id="{138255A1-CDF5-0189-6DB1-D772C8EA8E4E}"/>
+              </a:ext>
+            </a:extLst>
+          </p:cNvPr>
+          <p:cNvSpPr>
+            <a:spLocks noGrp="1"/>
+          </p:cNvSpPr>
+          <p:nvPr>
+            <p:ph type="title"/>
+          </p:nvPr>
+        </p:nvSpPr>
+        <p:spPr/>
+        <p:txBody>
+          <a:bodyPr/>
+          <a:lstStyle/>
+          <a:p>
+            <a:r>
+              <a:rPr lang="en-US" dirty="0"/>
+              <a:t>Figure X. Detection frequency plots</a:t>
+            </a:r>
+          </a:p>
+        </p:txBody>
+      </p:sp>
+      <p:sp>
+        <p:nvSpPr>
+          <p:cNvPr id="3" name="Content Placeholder 2">
+            <a:extLst>
+              <a:ext uri="{FF2B5EF4-FFF2-40B4-BE49-F238E27FC236}">
+                <a16:creationId xmlns:a16="http://schemas.microsoft.com/office/drawing/2014/main" id="{D34C1C23-95CC-CA70-0BAA-79FDF8A6AFE1}"/>
+              </a:ext>
+            </a:extLst>
+          </p:cNvPr>
+          <p:cNvSpPr>
+            <a:spLocks noGrp="1"/>
+          </p:cNvSpPr>
+          <p:nvPr>
+            <p:ph idx="1"/>
+          </p:nvPr>
+        </p:nvSpPr>
+        <p:spPr/>
+        <p:txBody>
+          <a:bodyPr/>
+          <a:lstStyle/>
+          <a:p>
+            <a:endParaRPr lang="en-US"/>
+          </a:p>
+        </p:txBody>
+      </p:sp>
+    </p:spTree>
+    <p:extLst>
+      <p:ext uri="{BB962C8B-B14F-4D97-AF65-F5344CB8AC3E}">
+        <p14:creationId xmlns:p14="http://schemas.microsoft.com/office/powerpoint/2010/main" val="3634878464"/>
+      </p:ext>
+    </p:extLst>
+  </p:cSld>
+  <p:clrMapOvr>
+    <a:masterClrMapping/>
+  </p:clrMapOvr>
+</p:sld>
+</file>
+
+<file path=ppt/slides/slide4.xml><?xml version="1.0" encoding="utf-8"?>
+<p:sld xmlns:a="http://schemas.openxmlformats.org/drawingml/2006/main" xmlns:r="http://schemas.openxmlformats.org/officeDocument/2006/relationships" xmlns:p="http://schemas.openxmlformats.org/presentationml/2006/main">
+  <p:cSld>
+    <p:spTree>
+      <p:nvGrpSpPr>
+        <p:cNvPr id="1" name=""/>
+        <p:cNvGrpSpPr/>
+        <p:nvPr/>
+      </p:nvGrpSpPr>
+      <p:grpSpPr>
+        <a:xfrm>
+          <a:off x="0" y="0"/>
+          <a:ext cx="0" cy="0"/>
+          <a:chOff x="0" y="0"/>
+          <a:chExt cx="0" cy="0"/>
+        </a:xfrm>
+      </p:grpSpPr>
+      <p:sp>
+        <p:nvSpPr>
+          <p:cNvPr id="2" name="Title 1">
+            <a:extLst>
+              <a:ext uri="{FF2B5EF4-FFF2-40B4-BE49-F238E27FC236}">
+                <a16:creationId xmlns:a16="http://schemas.microsoft.com/office/drawing/2014/main" id="{D17DFBCE-E937-D5D2-4AFC-FFA2710A6434}"/>
+              </a:ext>
+            </a:extLst>
+          </p:cNvPr>
+          <p:cNvSpPr>
+            <a:spLocks noGrp="1"/>
+          </p:cNvSpPr>
+          <p:nvPr>
+            <p:ph type="title"/>
+          </p:nvPr>
+        </p:nvSpPr>
+        <p:spPr>
+          <a:xfrm>
+            <a:off x="0" y="146916"/>
+            <a:ext cx="3193473" cy="3479511"/>
+          </a:xfrm>
+        </p:spPr>
+        <p:txBody>
+          <a:bodyPr>
+            <a:normAutofit/>
+          </a:bodyPr>
+          <a:lstStyle/>
+          <a:p>
+            <a:r>
+              <a:rPr lang="en-US" sz="1800" dirty="0"/>
+              <a:t>Figure X. Matrix specific plots </a:t>
+            </a:r>
+          </a:p>
+        </p:txBody>
+      </p:sp>
       <p:pic>
         <p:nvPicPr>
-          <p:cNvPr id="4" name="Content Placeholder 4" descr="Chart&#10;&#10;Description automatically generated with low confidence">
-            <a:extLst>
-              <a:ext uri="{FF2B5EF4-FFF2-40B4-BE49-F238E27FC236}">
-                <a16:creationId xmlns:a16="http://schemas.microsoft.com/office/drawing/2014/main" id="{3D79619E-9B21-716D-E91C-B5392DC1E5F0}"/>
+          <p:cNvPr id="5" name="Content Placeholder 4" descr="Chart, scatter chart&#10;&#10;Description automatically generated">
+            <a:extLst>
+              <a:ext uri="{FF2B5EF4-FFF2-40B4-BE49-F238E27FC236}">
+                <a16:creationId xmlns:a16="http://schemas.microsoft.com/office/drawing/2014/main" id="{A2A9E4D9-D5C9-1740-9329-AE65DA825FA1}"/>
               </a:ext>
             </a:extLst>
           </p:cNvPr>
           <p:cNvPicPr>
-            <a:picLocks noChangeAspect="1"/>
+            <a:picLocks noGrp="1" noChangeAspect="1"/>
           </p:cNvPicPr>
-          <p:nvPr/>
+          <p:nvPr>
+            <p:ph idx="1"/>
+          </p:nvPr>
         </p:nvPicPr>
         <p:blipFill>
           <a:blip r:embed="rId2">
@@ -3536,54 +3671,224 @@
         </p:blipFill>
         <p:spPr>
           <a:xfrm>
-            <a:off x="1533442" y="2955"/>
-            <a:ext cx="3917167" cy="6855045"/>
+            <a:off x="3314356" y="0"/>
+            <a:ext cx="8783782" cy="6587836"/>
+          </a:xfrm>
+        </p:spPr>
+      </p:pic>
+      <p:sp>
+        <p:nvSpPr>
+          <p:cNvPr id="6" name="TextBox 5">
+            <a:extLst>
+              <a:ext uri="{FF2B5EF4-FFF2-40B4-BE49-F238E27FC236}">
+                <a16:creationId xmlns:a16="http://schemas.microsoft.com/office/drawing/2014/main" id="{A5B58635-BF7C-F026-DFE0-4D29914AB0CF}"/>
+              </a:ext>
+            </a:extLst>
+          </p:cNvPr>
+          <p:cNvSpPr txBox="1"/>
+          <p:nvPr/>
+        </p:nvSpPr>
+        <p:spPr>
+          <a:xfrm>
+            <a:off x="343244" y="4561609"/>
+            <a:ext cx="2451911" cy="1754326"/>
           </a:xfrm>
           <a:prstGeom prst="rect">
             <a:avLst/>
           </a:prstGeom>
+          <a:noFill/>
         </p:spPr>
-      </p:pic>
-      <p:pic>
-        <p:nvPicPr>
-          <p:cNvPr id="6" name="Picture 5" descr="A picture containing chart&#10;&#10;Description automatically generated">
-            <a:extLst>
-              <a:ext uri="{FF2B5EF4-FFF2-40B4-BE49-F238E27FC236}">
-                <a16:creationId xmlns:a16="http://schemas.microsoft.com/office/drawing/2014/main" id="{90B7371B-A07F-F534-E838-BD00FE658648}"/>
-              </a:ext>
-            </a:extLst>
-          </p:cNvPr>
-          <p:cNvPicPr>
-            <a:picLocks noChangeAspect="1"/>
-          </p:cNvPicPr>
-          <p:nvPr/>
-        </p:nvPicPr>
-        <p:blipFill>
-          <a:blip r:embed="rId3">
-            <a:extLst>
-              <a:ext uri="{28A0092B-C50C-407E-A947-70E740481C1C}">
-                <a14:useLocalDpi xmlns:a14="http://schemas.microsoft.com/office/drawing/2010/main" val="0"/>
-              </a:ext>
-            </a:extLst>
-          </a:blip>
-          <a:stretch>
-            <a:fillRect/>
-          </a:stretch>
-        </p:blipFill>
-        <p:spPr>
-          <a:xfrm>
-            <a:off x="5634182" y="0"/>
-            <a:ext cx="3881912" cy="6793346"/>
-          </a:xfrm>
-          <a:prstGeom prst="rect">
-            <a:avLst/>
-          </a:prstGeom>
-        </p:spPr>
-      </p:pic>
+        <p:txBody>
+          <a:bodyPr wrap="square" rtlCol="0">
+            <a:spAutoFit/>
+          </a:bodyPr>
+          <a:lstStyle/>
+          <a:p>
+            <a:r>
+              <a:rPr lang="en-US" dirty="0"/>
+              <a:t>Needed edits: confirm units, no labels for log(conc) &lt; -2.5 and </a:t>
+            </a:r>
+            <a:r>
+              <a:rPr lang="en-US" dirty="0" err="1"/>
+              <a:t>det_freq</a:t>
+            </a:r>
+            <a:r>
+              <a:rPr lang="en-US" dirty="0"/>
+              <a:t> &lt;0.25, situate legend inside figure with chemical types.</a:t>
+            </a:r>
+          </a:p>
+        </p:txBody>
+      </p:sp>
     </p:spTree>
     <p:extLst>
       <p:ext uri="{BB962C8B-B14F-4D97-AF65-F5344CB8AC3E}">
-        <p14:creationId xmlns:p14="http://schemas.microsoft.com/office/powerpoint/2010/main" val="3837175291"/>
+        <p14:creationId xmlns:p14="http://schemas.microsoft.com/office/powerpoint/2010/main" val="3234579706"/>
+      </p:ext>
+    </p:extLst>
+  </p:cSld>
+  <p:clrMapOvr>
+    <a:masterClrMapping/>
+  </p:clrMapOvr>
+</p:sld>
+</file>
+
+<file path=ppt/slides/slide5.xml><?xml version="1.0" encoding="utf-8"?>
+<p:sld xmlns:a="http://schemas.openxmlformats.org/drawingml/2006/main" xmlns:r="http://schemas.openxmlformats.org/officeDocument/2006/relationships" xmlns:p="http://schemas.openxmlformats.org/presentationml/2006/main">
+  <p:cSld>
+    <p:spTree>
+      <p:nvGrpSpPr>
+        <p:cNvPr id="1" name=""/>
+        <p:cNvGrpSpPr/>
+        <p:nvPr/>
+      </p:nvGrpSpPr>
+      <p:grpSpPr>
+        <a:xfrm>
+          <a:off x="0" y="0"/>
+          <a:ext cx="0" cy="0"/>
+          <a:chOff x="0" y="0"/>
+          <a:chExt cx="0" cy="0"/>
+        </a:xfrm>
+      </p:grpSpPr>
+      <p:sp>
+        <p:nvSpPr>
+          <p:cNvPr id="2" name="Title 1">
+            <a:extLst>
+              <a:ext uri="{FF2B5EF4-FFF2-40B4-BE49-F238E27FC236}">
+                <a16:creationId xmlns:a16="http://schemas.microsoft.com/office/drawing/2014/main" id="{9DA71D0C-EE2C-1049-B261-A715858F55D4}"/>
+              </a:ext>
+            </a:extLst>
+          </p:cNvPr>
+          <p:cNvSpPr>
+            <a:spLocks noGrp="1"/>
+          </p:cNvSpPr>
+          <p:nvPr>
+            <p:ph type="title"/>
+          </p:nvPr>
+        </p:nvSpPr>
+        <p:spPr/>
+        <p:txBody>
+          <a:bodyPr/>
+          <a:lstStyle/>
+          <a:p>
+            <a:r>
+              <a:rPr lang="en-US" dirty="0"/>
+              <a:t>Kernel density plots</a:t>
+            </a:r>
+          </a:p>
+        </p:txBody>
+      </p:sp>
+      <p:sp>
+        <p:nvSpPr>
+          <p:cNvPr id="3" name="Content Placeholder 2">
+            <a:extLst>
+              <a:ext uri="{FF2B5EF4-FFF2-40B4-BE49-F238E27FC236}">
+                <a16:creationId xmlns:a16="http://schemas.microsoft.com/office/drawing/2014/main" id="{73405BC4-F208-6927-1CDC-D4D0B0A09715}"/>
+              </a:ext>
+            </a:extLst>
+          </p:cNvPr>
+          <p:cNvSpPr>
+            <a:spLocks noGrp="1"/>
+          </p:cNvSpPr>
+          <p:nvPr>
+            <p:ph idx="1"/>
+          </p:nvPr>
+        </p:nvSpPr>
+        <p:spPr/>
+        <p:txBody>
+          <a:bodyPr/>
+          <a:lstStyle/>
+          <a:p>
+            <a:endParaRPr lang="en-US"/>
+          </a:p>
+        </p:txBody>
+      </p:sp>
+    </p:spTree>
+    <p:extLst>
+      <p:ext uri="{BB962C8B-B14F-4D97-AF65-F5344CB8AC3E}">
+        <p14:creationId xmlns:p14="http://schemas.microsoft.com/office/powerpoint/2010/main" val="2692617677"/>
+      </p:ext>
+    </p:extLst>
+  </p:cSld>
+  <p:clrMapOvr>
+    <a:masterClrMapping/>
+  </p:clrMapOvr>
+</p:sld>
+</file>
+
+<file path=ppt/slides/slide6.xml><?xml version="1.0" encoding="utf-8"?>
+<p:sld xmlns:a="http://schemas.openxmlformats.org/drawingml/2006/main" xmlns:r="http://schemas.openxmlformats.org/officeDocument/2006/relationships" xmlns:p="http://schemas.openxmlformats.org/presentationml/2006/main">
+  <p:cSld>
+    <p:spTree>
+      <p:nvGrpSpPr>
+        <p:cNvPr id="1" name=""/>
+        <p:cNvGrpSpPr/>
+        <p:nvPr/>
+      </p:nvGrpSpPr>
+      <p:grpSpPr>
+        <a:xfrm>
+          <a:off x="0" y="0"/>
+          <a:ext cx="0" cy="0"/>
+          <a:chOff x="0" y="0"/>
+          <a:chExt cx="0" cy="0"/>
+        </a:xfrm>
+      </p:grpSpPr>
+      <p:sp>
+        <p:nvSpPr>
+          <p:cNvPr id="2" name="Title 1">
+            <a:extLst>
+              <a:ext uri="{FF2B5EF4-FFF2-40B4-BE49-F238E27FC236}">
+                <a16:creationId xmlns:a16="http://schemas.microsoft.com/office/drawing/2014/main" id="{04434281-C900-12D5-588A-155E67E3547B}"/>
+              </a:ext>
+            </a:extLst>
+          </p:cNvPr>
+          <p:cNvSpPr>
+            <a:spLocks noGrp="1"/>
+          </p:cNvSpPr>
+          <p:nvPr>
+            <p:ph type="title"/>
+          </p:nvPr>
+        </p:nvSpPr>
+        <p:spPr/>
+        <p:txBody>
+          <a:bodyPr/>
+          <a:lstStyle/>
+          <a:p>
+            <a:r>
+              <a:rPr lang="en-US" dirty="0"/>
+              <a:t>Kernel density based on ag coverage</a:t>
+            </a:r>
+          </a:p>
+        </p:txBody>
+      </p:sp>
+      <p:sp>
+        <p:nvSpPr>
+          <p:cNvPr id="3" name="Content Placeholder 2">
+            <a:extLst>
+              <a:ext uri="{FF2B5EF4-FFF2-40B4-BE49-F238E27FC236}">
+                <a16:creationId xmlns:a16="http://schemas.microsoft.com/office/drawing/2014/main" id="{46DE7DCA-8537-5E0A-0AE7-31D824704D5F}"/>
+              </a:ext>
+            </a:extLst>
+          </p:cNvPr>
+          <p:cNvSpPr>
+            <a:spLocks noGrp="1"/>
+          </p:cNvSpPr>
+          <p:nvPr>
+            <p:ph idx="1"/>
+          </p:nvPr>
+        </p:nvSpPr>
+        <p:spPr/>
+        <p:txBody>
+          <a:bodyPr/>
+          <a:lstStyle/>
+          <a:p>
+            <a:endParaRPr lang="en-US"/>
+          </a:p>
+        </p:txBody>
+      </p:sp>
+    </p:spTree>
+    <p:extLst>
+      <p:ext uri="{BB962C8B-B14F-4D97-AF65-F5344CB8AC3E}">
+        <p14:creationId xmlns:p14="http://schemas.microsoft.com/office/powerpoint/2010/main" val="748743342"/>
       </p:ext>
     </p:extLst>
   </p:cSld>

</xml_diff>

<commit_message>
boxplot comparisons for manuscript figure
</commit_message>
<xml_diff>
--- a/pptx/glinski_bee_matrices.pptx
+++ b/pptx/glinski_bee_matrices.pptx
@@ -6,11 +6,12 @@
   </p:sldMasterIdLst>
   <p:sldIdLst>
     <p:sldId id="256" r:id="rId2"/>
-    <p:sldId id="259" r:id="rId3"/>
-    <p:sldId id="261" r:id="rId4"/>
-    <p:sldId id="260" r:id="rId5"/>
-    <p:sldId id="262" r:id="rId6"/>
+    <p:sldId id="264" r:id="rId3"/>
+    <p:sldId id="259" r:id="rId4"/>
+    <p:sldId id="262" r:id="rId5"/>
+    <p:sldId id="261" r:id="rId6"/>
     <p:sldId id="263" r:id="rId7"/>
+    <p:sldId id="265" r:id="rId8"/>
   </p:sldIdLst>
   <p:sldSz cx="12192000" cy="6858000"/>
   <p:notesSz cx="6858000" cy="9144000"/>
@@ -264,7 +265,7 @@
           <a:p>
             <a:fld id="{EABB898F-4C09-408E-8555-5949496D4208}" type="datetimeFigureOut">
               <a:rPr lang="en-US" smtClean="0"/>
-              <a:t>3/30/2023</a:t>
+              <a:t>4/10/2023</a:t>
             </a:fld>
             <a:endParaRPr lang="en-US"/>
           </a:p>
@@ -462,7 +463,7 @@
           <a:p>
             <a:fld id="{EABB898F-4C09-408E-8555-5949496D4208}" type="datetimeFigureOut">
               <a:rPr lang="en-US" smtClean="0"/>
-              <a:t>3/30/2023</a:t>
+              <a:t>4/10/2023</a:t>
             </a:fld>
             <a:endParaRPr lang="en-US"/>
           </a:p>
@@ -670,7 +671,7 @@
           <a:p>
             <a:fld id="{EABB898F-4C09-408E-8555-5949496D4208}" type="datetimeFigureOut">
               <a:rPr lang="en-US" smtClean="0"/>
-              <a:t>3/30/2023</a:t>
+              <a:t>4/10/2023</a:t>
             </a:fld>
             <a:endParaRPr lang="en-US"/>
           </a:p>
@@ -868,7 +869,7 @@
           <a:p>
             <a:fld id="{EABB898F-4C09-408E-8555-5949496D4208}" type="datetimeFigureOut">
               <a:rPr lang="en-US" smtClean="0"/>
-              <a:t>3/30/2023</a:t>
+              <a:t>4/10/2023</a:t>
             </a:fld>
             <a:endParaRPr lang="en-US"/>
           </a:p>
@@ -1143,7 +1144,7 @@
           <a:p>
             <a:fld id="{EABB898F-4C09-408E-8555-5949496D4208}" type="datetimeFigureOut">
               <a:rPr lang="en-US" smtClean="0"/>
-              <a:t>3/30/2023</a:t>
+              <a:t>4/10/2023</a:t>
             </a:fld>
             <a:endParaRPr lang="en-US"/>
           </a:p>
@@ -1408,7 +1409,7 @@
           <a:p>
             <a:fld id="{EABB898F-4C09-408E-8555-5949496D4208}" type="datetimeFigureOut">
               <a:rPr lang="en-US" smtClean="0"/>
-              <a:t>3/30/2023</a:t>
+              <a:t>4/10/2023</a:t>
             </a:fld>
             <a:endParaRPr lang="en-US"/>
           </a:p>
@@ -1820,7 +1821,7 @@
           <a:p>
             <a:fld id="{EABB898F-4C09-408E-8555-5949496D4208}" type="datetimeFigureOut">
               <a:rPr lang="en-US" smtClean="0"/>
-              <a:t>3/30/2023</a:t>
+              <a:t>4/10/2023</a:t>
             </a:fld>
             <a:endParaRPr lang="en-US"/>
           </a:p>
@@ -1961,7 +1962,7 @@
           <a:p>
             <a:fld id="{EABB898F-4C09-408E-8555-5949496D4208}" type="datetimeFigureOut">
               <a:rPr lang="en-US" smtClean="0"/>
-              <a:t>3/30/2023</a:t>
+              <a:t>4/10/2023</a:t>
             </a:fld>
             <a:endParaRPr lang="en-US"/>
           </a:p>
@@ -2074,7 +2075,7 @@
           <a:p>
             <a:fld id="{EABB898F-4C09-408E-8555-5949496D4208}" type="datetimeFigureOut">
               <a:rPr lang="en-US" smtClean="0"/>
-              <a:t>3/30/2023</a:t>
+              <a:t>4/10/2023</a:t>
             </a:fld>
             <a:endParaRPr lang="en-US"/>
           </a:p>
@@ -2385,7 +2386,7 @@
           <a:p>
             <a:fld id="{EABB898F-4C09-408E-8555-5949496D4208}" type="datetimeFigureOut">
               <a:rPr lang="en-US" smtClean="0"/>
-              <a:t>3/30/2023</a:t>
+              <a:t>4/10/2023</a:t>
             </a:fld>
             <a:endParaRPr lang="en-US"/>
           </a:p>
@@ -2673,7 +2674,7 @@
           <a:p>
             <a:fld id="{EABB898F-4C09-408E-8555-5949496D4208}" type="datetimeFigureOut">
               <a:rPr lang="en-US" smtClean="0"/>
-              <a:t>3/30/2023</a:t>
+              <a:t>4/10/2023</a:t>
             </a:fld>
             <a:endParaRPr lang="en-US"/>
           </a:p>
@@ -2914,7 +2915,7 @@
           <a:p>
             <a:fld id="{EABB898F-4C09-408E-8555-5949496D4208}" type="datetimeFigureOut">
               <a:rPr lang="en-US" smtClean="0"/>
-              <a:t>3/30/2023</a:t>
+              <a:t>4/10/2023</a:t>
             </a:fld>
             <a:endParaRPr lang="en-US"/>
           </a:p>
@@ -3381,7 +3382,10 @@
           <a:bodyPr/>
           <a:lstStyle/>
           <a:p>
-            <a:endParaRPr lang="en-US"/>
+            <a:r>
+              <a:rPr lang="en-US" dirty="0"/>
+              <a:t>Stoten or chemosphere</a:t>
+            </a:r>
           </a:p>
         </p:txBody>
       </p:sp>
@@ -3420,7 +3424,7 @@
           <p:cNvPr id="2" name="Title 1">
             <a:extLst>
               <a:ext uri="{FF2B5EF4-FFF2-40B4-BE49-F238E27FC236}">
-                <a16:creationId xmlns:a16="http://schemas.microsoft.com/office/drawing/2014/main" id="{8D0DAFD3-ACD4-7A96-80FB-C6CAE40234B6}"/>
+                <a16:creationId xmlns:a16="http://schemas.microsoft.com/office/drawing/2014/main" id="{294958C4-0C9B-40B4-59F5-6A323423751B}"/>
               </a:ext>
             </a:extLst>
           </p:cNvPr>
@@ -3433,8 +3437,8 @@
         </p:nvSpPr>
         <p:spPr>
           <a:xfrm>
-            <a:off x="412172" y="344343"/>
-            <a:ext cx="5028373" cy="4619543"/>
+            <a:off x="979559" y="697828"/>
+            <a:ext cx="3954750" cy="3137200"/>
           </a:xfrm>
         </p:spPr>
         <p:txBody>
@@ -3445,58 +3449,213 @@
           <a:p>
             <a:r>
               <a:rPr lang="en-US" sz="1800" dirty="0"/>
-              <a:t>Figure X. Heatmap of mean logged chemical concentrations for the different measured matrices. Screening consists of keeping chemicals with greater that 10% detection frequency in 2 or more matrices. Low and high refer to agricultural cover in the vicinity… Matrix type is more influential than agricultural cover for clustering (columns). However, high ag has higher concs more often than not within a media type. The consistently cross-matrix chemical cluster (top 11 rows) are a number of </a:t>
-            </a:r>
-            <a:r>
-              <a:rPr lang="en-US" sz="1800" dirty="0" err="1"/>
-              <a:t>neonics</a:t>
-            </a:r>
-            <a:r>
+              <a:t>Figure 1. Locations of apiary study sites in central Ohio (1A). A bar chart representing the proportional landscape gradient within a 2 km radius of each apiary (1B).</a:t>
+            </a:r>
+            <a:br>
               <a:rPr lang="en-US" sz="1800" dirty="0"/>
-              <a:t> and …</a:t>
-            </a:r>
-          </a:p>
-        </p:txBody>
-      </p:sp>
-      <p:pic>
-        <p:nvPicPr>
-          <p:cNvPr id="5" name="Content Placeholder 4" descr="Chart, box and whisker chart&#10;&#10;Description automatically generated">
-            <a:extLst>
-              <a:ext uri="{FF2B5EF4-FFF2-40B4-BE49-F238E27FC236}">
-                <a16:creationId xmlns:a16="http://schemas.microsoft.com/office/drawing/2014/main" id="{A26B7659-632B-7048-8F56-8F948941EBBB}"/>
-              </a:ext>
-            </a:extLst>
-          </p:cNvPr>
-          <p:cNvPicPr>
-            <a:picLocks noGrp="1" noChangeAspect="1"/>
-          </p:cNvPicPr>
-          <p:nvPr>
-            <p:ph idx="1"/>
-          </p:nvPr>
-        </p:nvPicPr>
-        <p:blipFill>
-          <a:blip r:embed="rId2">
-            <a:extLst>
-              <a:ext uri="{28A0092B-C50C-407E-A947-70E740481C1C}">
-                <a14:useLocalDpi xmlns:a14="http://schemas.microsoft.com/office/drawing/2010/main" val="0"/>
-              </a:ext>
-            </a:extLst>
-          </a:blip>
-          <a:stretch>
-            <a:fillRect/>
-          </a:stretch>
-        </p:blipFill>
-        <p:spPr>
+            </a:br>
+            <a:br>
+              <a:rPr lang="en-US" sz="1800" dirty="0"/>
+            </a:br>
+            <a:r>
+              <a:rPr lang="en-US" sz="1800" dirty="0"/>
+              <a:t>Alternative map for 1A, and figure for 1B.</a:t>
+            </a:r>
+          </a:p>
+        </p:txBody>
+      </p:sp>
+      <p:grpSp>
+        <p:nvGrpSpPr>
+          <p:cNvPr id="9" name="Group 8">
+            <a:extLst>
+              <a:ext uri="{FF2B5EF4-FFF2-40B4-BE49-F238E27FC236}">
+                <a16:creationId xmlns:a16="http://schemas.microsoft.com/office/drawing/2014/main" id="{83868C4F-1689-8E5A-28FE-1366B1BF7833}"/>
+              </a:ext>
+            </a:extLst>
+          </p:cNvPr>
+          <p:cNvGrpSpPr/>
+          <p:nvPr/>
+        </p:nvGrpSpPr>
+        <p:grpSpPr>
           <a:xfrm>
-            <a:off x="5440546" y="0"/>
-            <a:ext cx="6629400" cy="6629400"/>
+            <a:off x="6841208" y="19250"/>
+            <a:ext cx="5350792" cy="6857999"/>
+            <a:chOff x="6841208" y="19250"/>
+            <a:chExt cx="5350792" cy="6857999"/>
           </a:xfrm>
-        </p:spPr>
-      </p:pic>
+        </p:grpSpPr>
+        <p:grpSp>
+          <p:nvGrpSpPr>
+            <p:cNvPr id="6" name="Group 5">
+              <a:extLst>
+                <a:ext uri="{FF2B5EF4-FFF2-40B4-BE49-F238E27FC236}">
+                  <a16:creationId xmlns:a16="http://schemas.microsoft.com/office/drawing/2014/main" id="{5F89831D-684D-C78F-63FE-554B9B9FFAFC}"/>
+                </a:ext>
+              </a:extLst>
+            </p:cNvPr>
+            <p:cNvGrpSpPr/>
+            <p:nvPr/>
+          </p:nvGrpSpPr>
+          <p:grpSpPr>
+            <a:xfrm>
+              <a:off x="6841208" y="19250"/>
+              <a:ext cx="5350792" cy="6857999"/>
+              <a:chOff x="6841208" y="19250"/>
+              <a:chExt cx="5350792" cy="6857999"/>
+            </a:xfrm>
+          </p:grpSpPr>
+          <p:pic>
+            <p:nvPicPr>
+              <p:cNvPr id="4" name="Picture 3">
+                <a:extLst>
+                  <a:ext uri="{FF2B5EF4-FFF2-40B4-BE49-F238E27FC236}">
+                    <a16:creationId xmlns:a16="http://schemas.microsoft.com/office/drawing/2014/main" id="{FDACCF71-057B-89CC-6835-CD5F69941F2E}"/>
+                  </a:ext>
+                </a:extLst>
+              </p:cNvPr>
+              <p:cNvPicPr>
+                <a:picLocks noChangeAspect="1"/>
+              </p:cNvPicPr>
+              <p:nvPr/>
+            </p:nvPicPr>
+            <p:blipFill>
+              <a:blip r:embed="rId2">
+                <a:extLst>
+                  <a:ext uri="{28A0092B-C50C-407E-A947-70E740481C1C}">
+                    <a14:useLocalDpi xmlns:a14="http://schemas.microsoft.com/office/drawing/2010/main" val="0"/>
+                  </a:ext>
+                </a:extLst>
+              </a:blip>
+              <a:srcRect/>
+              <a:stretch>
+                <a:fillRect/>
+              </a:stretch>
+            </p:blipFill>
+            <p:spPr bwMode="auto">
+              <a:xfrm>
+                <a:off x="6841208" y="3410426"/>
+                <a:ext cx="5350792" cy="3466823"/>
+              </a:xfrm>
+              <a:prstGeom prst="rect">
+                <a:avLst/>
+              </a:prstGeom>
+              <a:noFill/>
+            </p:spPr>
+          </p:pic>
+          <p:pic>
+            <p:nvPicPr>
+              <p:cNvPr id="5" name="Picture 4">
+                <a:extLst>
+                  <a:ext uri="{FF2B5EF4-FFF2-40B4-BE49-F238E27FC236}">
+                    <a16:creationId xmlns:a16="http://schemas.microsoft.com/office/drawing/2014/main" id="{1E30E3FE-9347-1C40-EF97-DBEDDC9CF10E}"/>
+                  </a:ext>
+                </a:extLst>
+              </p:cNvPr>
+              <p:cNvPicPr>
+                <a:picLocks noChangeAspect="1"/>
+              </p:cNvPicPr>
+              <p:nvPr/>
+            </p:nvPicPr>
+            <p:blipFill>
+              <a:blip r:embed="rId3">
+                <a:extLst>
+                  <a:ext uri="{28A0092B-C50C-407E-A947-70E740481C1C}">
+                    <a14:useLocalDpi xmlns:a14="http://schemas.microsoft.com/office/drawing/2010/main" val="0"/>
+                  </a:ext>
+                </a:extLst>
+              </a:blip>
+              <a:srcRect/>
+              <a:stretch>
+                <a:fillRect/>
+              </a:stretch>
+            </p:blipFill>
+            <p:spPr bwMode="auto">
+              <a:xfrm>
+                <a:off x="7295147" y="19250"/>
+                <a:ext cx="4091539" cy="3418654"/>
+              </a:xfrm>
+              <a:prstGeom prst="rect">
+                <a:avLst/>
+              </a:prstGeom>
+              <a:noFill/>
+            </p:spPr>
+          </p:pic>
+        </p:grpSp>
+        <p:sp>
+          <p:nvSpPr>
+            <p:cNvPr id="7" name="TextBox 6">
+              <a:extLst>
+                <a:ext uri="{FF2B5EF4-FFF2-40B4-BE49-F238E27FC236}">
+                  <a16:creationId xmlns:a16="http://schemas.microsoft.com/office/drawing/2014/main" id="{5B293E70-7F9C-969D-2F37-B0B422501D98}"/>
+                </a:ext>
+              </a:extLst>
+            </p:cNvPr>
+            <p:cNvSpPr txBox="1"/>
+            <p:nvPr/>
+          </p:nvSpPr>
+          <p:spPr>
+            <a:xfrm>
+              <a:off x="6841208" y="19250"/>
+              <a:ext cx="603849" cy="369332"/>
+            </a:xfrm>
+            <a:prstGeom prst="rect">
+              <a:avLst/>
+            </a:prstGeom>
+            <a:noFill/>
+          </p:spPr>
+          <p:txBody>
+            <a:bodyPr wrap="square" rtlCol="0">
+              <a:spAutoFit/>
+            </a:bodyPr>
+            <a:lstStyle/>
+            <a:p>
+              <a:r>
+                <a:rPr lang="en-US" b="1" dirty="0"/>
+                <a:t>A</a:t>
+              </a:r>
+            </a:p>
+          </p:txBody>
+        </p:sp>
+        <p:sp>
+          <p:nvSpPr>
+            <p:cNvPr id="8" name="TextBox 7">
+              <a:extLst>
+                <a:ext uri="{FF2B5EF4-FFF2-40B4-BE49-F238E27FC236}">
+                  <a16:creationId xmlns:a16="http://schemas.microsoft.com/office/drawing/2014/main" id="{33EBC2D3-B238-574B-B849-D0968ECE4BE1}"/>
+                </a:ext>
+              </a:extLst>
+            </p:cNvPr>
+            <p:cNvSpPr txBox="1"/>
+            <p:nvPr/>
+          </p:nvSpPr>
+          <p:spPr>
+            <a:xfrm>
+              <a:off x="6841208" y="3595092"/>
+              <a:ext cx="603849" cy="369332"/>
+            </a:xfrm>
+            <a:prstGeom prst="rect">
+              <a:avLst/>
+            </a:prstGeom>
+            <a:noFill/>
+          </p:spPr>
+          <p:txBody>
+            <a:bodyPr wrap="square" rtlCol="0">
+              <a:spAutoFit/>
+            </a:bodyPr>
+            <a:lstStyle/>
+            <a:p>
+              <a:r>
+                <a:rPr lang="en-US" b="1" dirty="0"/>
+                <a:t>B</a:t>
+              </a:r>
+            </a:p>
+          </p:txBody>
+        </p:sp>
+      </p:grpSp>
     </p:spTree>
     <p:extLst>
       <p:ext uri="{BB962C8B-B14F-4D97-AF65-F5344CB8AC3E}">
-        <p14:creationId xmlns:p14="http://schemas.microsoft.com/office/powerpoint/2010/main" val="1376304758"/>
+        <p14:creationId xmlns:p14="http://schemas.microsoft.com/office/powerpoint/2010/main" val="1054383638"/>
       </p:ext>
     </p:extLst>
   </p:cSld>
@@ -3528,7 +3687,7 @@
           <p:cNvPr id="2" name="Title 1">
             <a:extLst>
               <a:ext uri="{FF2B5EF4-FFF2-40B4-BE49-F238E27FC236}">
-                <a16:creationId xmlns:a16="http://schemas.microsoft.com/office/drawing/2014/main" id="{138255A1-CDF5-0189-6DB1-D772C8EA8E4E}"/>
+                <a16:creationId xmlns:a16="http://schemas.microsoft.com/office/drawing/2014/main" id="{8D0DAFD3-ACD4-7A96-80FB-C6CAE40234B6}"/>
               </a:ext>
             </a:extLst>
           </p:cNvPr>
@@ -3539,47 +3698,83 @@
             <p:ph type="title"/>
           </p:nvPr>
         </p:nvSpPr>
-        <p:spPr/>
-        <p:txBody>
-          <a:bodyPr/>
-          <a:lstStyle/>
-          <a:p>
-            <a:r>
-              <a:rPr lang="en-US" dirty="0"/>
-              <a:t>Figure X. Detection frequency plots</a:t>
-            </a:r>
-          </a:p>
-        </p:txBody>
-      </p:sp>
-      <p:sp>
-        <p:nvSpPr>
-          <p:cNvPr id="3" name="Content Placeholder 2">
-            <a:extLst>
-              <a:ext uri="{FF2B5EF4-FFF2-40B4-BE49-F238E27FC236}">
-                <a16:creationId xmlns:a16="http://schemas.microsoft.com/office/drawing/2014/main" id="{D34C1C23-95CC-CA70-0BAA-79FDF8A6AFE1}"/>
-              </a:ext>
-            </a:extLst>
-          </p:cNvPr>
-          <p:cNvSpPr>
-            <a:spLocks noGrp="1"/>
-          </p:cNvSpPr>
-          <p:nvPr>
-            <p:ph idx="1"/>
-          </p:nvPr>
-        </p:nvSpPr>
-        <p:spPr/>
-        <p:txBody>
-          <a:bodyPr/>
-          <a:lstStyle/>
-          <a:p>
-            <a:endParaRPr lang="en-US"/>
-          </a:p>
-        </p:txBody>
-      </p:sp>
+        <p:spPr>
+          <a:xfrm>
+            <a:off x="412172" y="344343"/>
+            <a:ext cx="5299363" cy="3987025"/>
+          </a:xfrm>
+        </p:spPr>
+        <p:txBody>
+          <a:bodyPr>
+            <a:normAutofit fontScale="90000"/>
+          </a:bodyPr>
+          <a:lstStyle/>
+          <a:p>
+            <a:r>
+              <a:rPr lang="en-US" sz="1800" dirty="0"/>
+              <a:t>Figure 2. Scatterplot and heatmaps of screened chemical concentrations and detection frequencies across 6 bee matrices (dead bee traps (DBT), field pollen (FP), in-hive bee bread (IHBB), in-hive honey (IHH), in-hive larvae (IHL), and in-hive nurse bees (IHNB). Screening consists of keeping chemicals with greater that 10% detection frequency in 2 or more matrices. Heatmap of mean logged chemical concentrations for the different measured matrices. Screening consists of keeping chemicals with greater that 10% detection frequency in 2 or more matrices, resulting in 29 chemicals for further analysis. Low and high refer to agricultural cover in the vicinity… Matrix type is more influential than agricultural cover for clustering (columns). However, high ag has higher concs more often than not within a media type. The consistently cross-matrix chemical cluster (top 11 rows) are a number of </a:t>
+            </a:r>
+            <a:r>
+              <a:rPr lang="en-US" sz="1800" dirty="0" err="1"/>
+              <a:t>neonics</a:t>
+            </a:r>
+            <a:r>
+              <a:rPr lang="en-US" sz="1800" dirty="0"/>
+              <a:t> and …</a:t>
+            </a:r>
+            <a:br>
+              <a:rPr lang="en-US" sz="1800" dirty="0"/>
+            </a:br>
+            <a:br>
+              <a:rPr lang="en-US" sz="1800" dirty="0"/>
+            </a:br>
+            <a:r>
+              <a:rPr lang="en-US" sz="1800" dirty="0"/>
+              <a:t>(2B and 2C need legend titles, reverse figs 2B and 2C)</a:t>
+            </a:r>
+          </a:p>
+        </p:txBody>
+      </p:sp>
+      <p:pic>
+        <p:nvPicPr>
+          <p:cNvPr id="4" name="Picture 3" descr="Chart&#10;&#10;Description automatically generated">
+            <a:extLst>
+              <a:ext uri="{FF2B5EF4-FFF2-40B4-BE49-F238E27FC236}">
+                <a16:creationId xmlns:a16="http://schemas.microsoft.com/office/drawing/2014/main" id="{D4CD85FF-CDE4-EA2B-8905-447C36AC73FE}"/>
+              </a:ext>
+            </a:extLst>
+          </p:cNvPr>
+          <p:cNvPicPr>
+            <a:picLocks noChangeAspect="1"/>
+          </p:cNvPicPr>
+          <p:nvPr/>
+        </p:nvPicPr>
+        <p:blipFill>
+          <a:blip r:embed="rId2">
+            <a:extLst>
+              <a:ext uri="{28A0092B-C50C-407E-A947-70E740481C1C}">
+                <a14:useLocalDpi xmlns:a14="http://schemas.microsoft.com/office/drawing/2010/main" val="0"/>
+              </a:ext>
+            </a:extLst>
+          </a:blip>
+          <a:stretch>
+            <a:fillRect/>
+          </a:stretch>
+        </p:blipFill>
+        <p:spPr>
+          <a:xfrm>
+            <a:off x="6480463" y="0"/>
+            <a:ext cx="5299364" cy="6858000"/>
+          </a:xfrm>
+          <a:prstGeom prst="rect">
+            <a:avLst/>
+          </a:prstGeom>
+        </p:spPr>
+      </p:pic>
     </p:spTree>
     <p:extLst>
       <p:ext uri="{BB962C8B-B14F-4D97-AF65-F5344CB8AC3E}">
-        <p14:creationId xmlns:p14="http://schemas.microsoft.com/office/powerpoint/2010/main" val="3634878464"/>
+        <p14:creationId xmlns:p14="http://schemas.microsoft.com/office/powerpoint/2010/main" val="1376304758"/>
       </p:ext>
     </p:extLst>
   </p:cSld>
@@ -3611,7 +3806,7 @@
           <p:cNvPr id="2" name="Title 1">
             <a:extLst>
               <a:ext uri="{FF2B5EF4-FFF2-40B4-BE49-F238E27FC236}">
-                <a16:creationId xmlns:a16="http://schemas.microsoft.com/office/drawing/2014/main" id="{D17DFBCE-E937-D5D2-4AFC-FFA2710A6434}"/>
+                <a16:creationId xmlns:a16="http://schemas.microsoft.com/office/drawing/2014/main" id="{9DA71D0C-EE2C-1049-B261-A715858F55D4}"/>
               </a:ext>
             </a:extLst>
           </p:cNvPr>
@@ -3624,105 +3819,105 @@
         </p:nvSpPr>
         <p:spPr>
           <a:xfrm>
-            <a:off x="0" y="146916"/>
-            <a:ext cx="3193473" cy="3479511"/>
+            <a:off x="838200" y="365124"/>
+            <a:ext cx="4234132" cy="2179667"/>
           </a:xfrm>
         </p:spPr>
         <p:txBody>
           <a:bodyPr>
-            <a:normAutofit/>
+            <a:normAutofit fontScale="90000"/>
           </a:bodyPr>
           <a:lstStyle/>
           <a:p>
             <a:r>
               <a:rPr lang="en-US" sz="1800" dirty="0"/>
-              <a:t>Figure X. Matrix specific plots </a:t>
+              <a:t>Figure 3. Sample variability over all dates. Paired box plots of number of detects (out of 29) and cumulative concentrations in each sample (location * date) by matrix and </a:t>
+            </a:r>
+            <a:r>
+              <a:rPr lang="en-US" sz="1800" dirty="0" err="1"/>
+              <a:t>ag_cover</a:t>
+            </a:r>
+            <a:r>
+              <a:rPr lang="en-US" sz="1800" dirty="0"/>
+              <a:t>. Specific sample dates and locations are outliers in dead bee traps and pollen.</a:t>
+            </a:r>
+            <a:br>
+              <a:rPr lang="en-US" sz="1800" dirty="0"/>
+            </a:br>
+            <a:br>
+              <a:rPr lang="en-US" sz="1800" dirty="0"/>
+            </a:br>
+            <a:r>
+              <a:rPr lang="en-US" sz="1800" dirty="0"/>
+              <a:t>(drop legend on left and combine into one A/B figure)</a:t>
             </a:r>
           </a:p>
         </p:txBody>
       </p:sp>
       <p:pic>
         <p:nvPicPr>
-          <p:cNvPr id="5" name="Content Placeholder 4" descr="Chart, scatter chart&#10;&#10;Description automatically generated">
-            <a:extLst>
-              <a:ext uri="{FF2B5EF4-FFF2-40B4-BE49-F238E27FC236}">
-                <a16:creationId xmlns:a16="http://schemas.microsoft.com/office/drawing/2014/main" id="{A2A9E4D9-D5C9-1740-9329-AE65DA825FA1}"/>
+          <p:cNvPr id="5" name="Picture 4">
+            <a:extLst>
+              <a:ext uri="{FF2B5EF4-FFF2-40B4-BE49-F238E27FC236}">
+                <a16:creationId xmlns:a16="http://schemas.microsoft.com/office/drawing/2014/main" id="{2E3C86B0-8348-19FE-D903-161ACCE78C0F}"/>
               </a:ext>
             </a:extLst>
           </p:cNvPr>
           <p:cNvPicPr>
-            <a:picLocks noGrp="1" noChangeAspect="1"/>
+            <a:picLocks noChangeAspect="1"/>
           </p:cNvPicPr>
-          <p:nvPr>
-            <p:ph idx="1"/>
-          </p:nvPr>
+          <p:nvPr/>
         </p:nvPicPr>
         <p:blipFill>
-          <a:blip r:embed="rId2">
-            <a:extLst>
-              <a:ext uri="{28A0092B-C50C-407E-A947-70E740481C1C}">
-                <a14:useLocalDpi xmlns:a14="http://schemas.microsoft.com/office/drawing/2010/main" val="0"/>
-              </a:ext>
-            </a:extLst>
-          </a:blip>
+          <a:blip r:embed="rId2"/>
           <a:stretch>
             <a:fillRect/>
           </a:stretch>
         </p:blipFill>
         <p:spPr>
           <a:xfrm>
-            <a:off x="3314356" y="0"/>
-            <a:ext cx="8783782" cy="6587836"/>
-          </a:xfrm>
-        </p:spPr>
-      </p:pic>
-      <p:sp>
-        <p:nvSpPr>
-          <p:cNvPr id="6" name="TextBox 5">
-            <a:extLst>
-              <a:ext uri="{FF2B5EF4-FFF2-40B4-BE49-F238E27FC236}">
-                <a16:creationId xmlns:a16="http://schemas.microsoft.com/office/drawing/2014/main" id="{A5B58635-BF7C-F026-DFE0-4D29914AB0CF}"/>
-              </a:ext>
-            </a:extLst>
-          </p:cNvPr>
-          <p:cNvSpPr txBox="1"/>
-          <p:nvPr/>
-        </p:nvSpPr>
-        <p:spPr>
-          <a:xfrm>
-            <a:off x="343244" y="4561609"/>
-            <a:ext cx="2451911" cy="1754326"/>
+            <a:off x="5936971" y="0"/>
+            <a:ext cx="2336639" cy="6858000"/>
           </a:xfrm>
           <a:prstGeom prst="rect">
             <a:avLst/>
           </a:prstGeom>
-          <a:noFill/>
         </p:spPr>
-        <p:txBody>
-          <a:bodyPr wrap="square" rtlCol="0">
-            <a:spAutoFit/>
-          </a:bodyPr>
-          <a:lstStyle/>
-          <a:p>
-            <a:r>
-              <a:rPr lang="en-US" dirty="0"/>
-              <a:t>Needed edits: confirm units, no labels for log(conc) &lt; -2.5 and </a:t>
-            </a:r>
-            <a:r>
-              <a:rPr lang="en-US" dirty="0" err="1"/>
-              <a:t>det_freq</a:t>
-            </a:r>
-            <a:r>
-              <a:rPr lang="en-US" dirty="0"/>
-              <a:t> &lt;0.25, situate legend inside figure with chemical types.</a:t>
-            </a:r>
-          </a:p>
-        </p:txBody>
-      </p:sp>
+      </p:pic>
+      <p:pic>
+        <p:nvPicPr>
+          <p:cNvPr id="7" name="Picture 6">
+            <a:extLst>
+              <a:ext uri="{FF2B5EF4-FFF2-40B4-BE49-F238E27FC236}">
+                <a16:creationId xmlns:a16="http://schemas.microsoft.com/office/drawing/2014/main" id="{90CAE43A-B9B5-4D5A-D4D3-864BDC98FEBB}"/>
+              </a:ext>
+            </a:extLst>
+          </p:cNvPr>
+          <p:cNvPicPr>
+            <a:picLocks noChangeAspect="1"/>
+          </p:cNvPicPr>
+          <p:nvPr/>
+        </p:nvPicPr>
+        <p:blipFill>
+          <a:blip r:embed="rId3"/>
+          <a:stretch>
+            <a:fillRect/>
+          </a:stretch>
+        </p:blipFill>
+        <p:spPr>
+          <a:xfrm>
+            <a:off x="7765887" y="0"/>
+            <a:ext cx="2267396" cy="6858000"/>
+          </a:xfrm>
+          <a:prstGeom prst="rect">
+            <a:avLst/>
+          </a:prstGeom>
+        </p:spPr>
+      </p:pic>
     </p:spTree>
     <p:extLst>
       <p:ext uri="{BB962C8B-B14F-4D97-AF65-F5344CB8AC3E}">
-        <p14:creationId xmlns:p14="http://schemas.microsoft.com/office/powerpoint/2010/main" val="3234579706"/>
+        <p14:creationId xmlns:p14="http://schemas.microsoft.com/office/powerpoint/2010/main" val="2692617677"/>
       </p:ext>
     </p:extLst>
   </p:cSld>
@@ -3754,7 +3949,7 @@
           <p:cNvPr id="2" name="Title 1">
             <a:extLst>
               <a:ext uri="{FF2B5EF4-FFF2-40B4-BE49-F238E27FC236}">
-                <a16:creationId xmlns:a16="http://schemas.microsoft.com/office/drawing/2014/main" id="{9DA71D0C-EE2C-1049-B261-A715858F55D4}"/>
+                <a16:creationId xmlns:a16="http://schemas.microsoft.com/office/drawing/2014/main" id="{138255A1-CDF5-0189-6DB1-D772C8EA8E4E}"/>
               </a:ext>
             </a:extLst>
           </p:cNvPr>
@@ -3767,45 +3962,66 @@
         </p:nvSpPr>
         <p:spPr/>
         <p:txBody>
+          <a:bodyPr>
+            <a:normAutofit/>
+          </a:bodyPr>
+          <a:lstStyle/>
+          <a:p>
+            <a:r>
+              <a:rPr lang="en-US" sz="1800" dirty="0"/>
+              <a:t>Figure 4. Figure that clearly shows chemical class differences across matrices? (Dimensions are chemical, chemical class, matrix, </a:t>
+            </a:r>
+            <a:r>
+              <a:rPr lang="en-US" sz="1800" dirty="0" err="1"/>
+              <a:t>ag_cover</a:t>
+            </a:r>
+            <a:r>
+              <a:rPr lang="en-US" sz="1800" dirty="0"/>
+              <a:t>, apiary location; outcomes are detection frequency and concentrations) Mean (or boxplot) chemical concentrations by matrix, chemical class, and ag cover? (Paired box plots of chemical concentrations) </a:t>
+            </a:r>
+          </a:p>
+        </p:txBody>
+      </p:sp>
+      <p:sp>
+        <p:nvSpPr>
+          <p:cNvPr id="3" name="Content Placeholder 2">
+            <a:extLst>
+              <a:ext uri="{FF2B5EF4-FFF2-40B4-BE49-F238E27FC236}">
+                <a16:creationId xmlns:a16="http://schemas.microsoft.com/office/drawing/2014/main" id="{D34C1C23-95CC-CA70-0BAA-79FDF8A6AFE1}"/>
+              </a:ext>
+            </a:extLst>
+          </p:cNvPr>
+          <p:cNvSpPr>
+            <a:spLocks noGrp="1"/>
+          </p:cNvSpPr>
+          <p:nvPr>
+            <p:ph idx="1"/>
+          </p:nvPr>
+        </p:nvSpPr>
+        <p:spPr/>
+        <p:txBody>
           <a:bodyPr/>
           <a:lstStyle/>
           <a:p>
             <a:r>
               <a:rPr lang="en-US" dirty="0"/>
-              <a:t>Kernel density plots</a:t>
-            </a:r>
-          </a:p>
-        </p:txBody>
-      </p:sp>
-      <p:sp>
-        <p:nvSpPr>
-          <p:cNvPr id="3" name="Content Placeholder 2">
-            <a:extLst>
-              <a:ext uri="{FF2B5EF4-FFF2-40B4-BE49-F238E27FC236}">
-                <a16:creationId xmlns:a16="http://schemas.microsoft.com/office/drawing/2014/main" id="{73405BC4-F208-6927-1CDC-D4D0B0A09715}"/>
-              </a:ext>
-            </a:extLst>
-          </p:cNvPr>
-          <p:cNvSpPr>
-            <a:spLocks noGrp="1"/>
-          </p:cNvSpPr>
-          <p:nvPr>
-            <p:ph idx="1"/>
-          </p:nvPr>
-        </p:nvSpPr>
-        <p:spPr/>
-        <p:txBody>
-          <a:bodyPr/>
-          <a:lstStyle/>
-          <a:p>
-            <a:endParaRPr lang="en-US"/>
+              <a:t>Chemical class (5) along the x-axis, paired </a:t>
+            </a:r>
+            <a:r>
+              <a:rPr lang="en-US" dirty="0" err="1"/>
+              <a:t>ag_cover</a:t>
+            </a:r>
+            <a:r>
+              <a:rPr lang="en-US" dirty="0"/>
+              <a:t> concentration boxplots, and matrix (6) along the y, and pretty colors; it has to be mean since the different chemical classes have different numbers of chemicals</a:t>
+            </a:r>
           </a:p>
         </p:txBody>
       </p:sp>
     </p:spTree>
     <p:extLst>
       <p:ext uri="{BB962C8B-B14F-4D97-AF65-F5344CB8AC3E}">
-        <p14:creationId xmlns:p14="http://schemas.microsoft.com/office/powerpoint/2010/main" val="2692617677"/>
+        <p14:creationId xmlns:p14="http://schemas.microsoft.com/office/powerpoint/2010/main" val="3634878464"/>
       </p:ext>
     </p:extLst>
   </p:cSld>
@@ -3848,47 +4064,172 @@
             <p:ph type="title"/>
           </p:nvPr>
         </p:nvSpPr>
-        <p:spPr/>
-        <p:txBody>
-          <a:bodyPr/>
-          <a:lstStyle/>
-          <a:p>
-            <a:r>
-              <a:rPr lang="en-US" dirty="0"/>
-              <a:t>Kernel density based on ag coverage</a:t>
-            </a:r>
-          </a:p>
-        </p:txBody>
-      </p:sp>
-      <p:sp>
-        <p:nvSpPr>
-          <p:cNvPr id="3" name="Content Placeholder 2">
-            <a:extLst>
-              <a:ext uri="{FF2B5EF4-FFF2-40B4-BE49-F238E27FC236}">
-                <a16:creationId xmlns:a16="http://schemas.microsoft.com/office/drawing/2014/main" id="{46DE7DCA-8537-5E0A-0AE7-31D824704D5F}"/>
-              </a:ext>
-            </a:extLst>
-          </p:cNvPr>
-          <p:cNvSpPr>
-            <a:spLocks noGrp="1"/>
-          </p:cNvSpPr>
-          <p:nvPr>
-            <p:ph idx="1"/>
-          </p:nvPr>
-        </p:nvSpPr>
-        <p:spPr/>
-        <p:txBody>
-          <a:bodyPr/>
-          <a:lstStyle/>
-          <a:p>
-            <a:endParaRPr lang="en-US"/>
-          </a:p>
-        </p:txBody>
-      </p:sp>
+        <p:spPr>
+          <a:xfrm>
+            <a:off x="838200" y="0"/>
+            <a:ext cx="10515600" cy="1325563"/>
+          </a:xfrm>
+        </p:spPr>
+        <p:txBody>
+          <a:bodyPr>
+            <a:normAutofit/>
+          </a:bodyPr>
+          <a:lstStyle/>
+          <a:p>
+            <a:r>
+              <a:rPr lang="en-US" sz="1800" dirty="0"/>
+              <a:t>Figure 5. Pollen and dead bee trap concentrations over time. Note that high miticide concentrations may be conflated with Varroa infestation. (Looking to highlight the very high concentration times). We are looking to highlight the outliers from figure 3 here.</a:t>
+            </a:r>
+          </a:p>
+        </p:txBody>
+      </p:sp>
+      <p:pic>
+        <p:nvPicPr>
+          <p:cNvPr id="5" name="Picture 4">
+            <a:extLst>
+              <a:ext uri="{FF2B5EF4-FFF2-40B4-BE49-F238E27FC236}">
+                <a16:creationId xmlns:a16="http://schemas.microsoft.com/office/drawing/2014/main" id="{DEEACE56-9B01-D123-CCBB-26FCE6D573E5}"/>
+              </a:ext>
+            </a:extLst>
+          </p:cNvPr>
+          <p:cNvPicPr>
+            <a:picLocks noChangeAspect="1"/>
+          </p:cNvPicPr>
+          <p:nvPr/>
+        </p:nvPicPr>
+        <p:blipFill>
+          <a:blip r:embed="rId2"/>
+          <a:stretch>
+            <a:fillRect/>
+          </a:stretch>
+        </p:blipFill>
+        <p:spPr>
+          <a:xfrm>
+            <a:off x="0" y="1457864"/>
+            <a:ext cx="6316706" cy="5400135"/>
+          </a:xfrm>
+          <a:prstGeom prst="rect">
+            <a:avLst/>
+          </a:prstGeom>
+        </p:spPr>
+      </p:pic>
+      <p:pic>
+        <p:nvPicPr>
+          <p:cNvPr id="7" name="Picture 6">
+            <a:extLst>
+              <a:ext uri="{FF2B5EF4-FFF2-40B4-BE49-F238E27FC236}">
+                <a16:creationId xmlns:a16="http://schemas.microsoft.com/office/drawing/2014/main" id="{B54F64E0-1179-9EF9-19E0-4F7845AA4FCC}"/>
+              </a:ext>
+            </a:extLst>
+          </p:cNvPr>
+          <p:cNvPicPr>
+            <a:picLocks noChangeAspect="1"/>
+          </p:cNvPicPr>
+          <p:nvPr/>
+        </p:nvPicPr>
+        <p:blipFill>
+          <a:blip r:embed="rId3"/>
+          <a:stretch>
+            <a:fillRect/>
+          </a:stretch>
+        </p:blipFill>
+        <p:spPr>
+          <a:xfrm>
+            <a:off x="5594354" y="1552756"/>
+            <a:ext cx="6643798" cy="5305244"/>
+          </a:xfrm>
+          <a:prstGeom prst="rect">
+            <a:avLst/>
+          </a:prstGeom>
+        </p:spPr>
+      </p:pic>
     </p:spTree>
     <p:extLst>
       <p:ext uri="{BB962C8B-B14F-4D97-AF65-F5344CB8AC3E}">
         <p14:creationId xmlns:p14="http://schemas.microsoft.com/office/powerpoint/2010/main" val="748743342"/>
+      </p:ext>
+    </p:extLst>
+  </p:cSld>
+  <p:clrMapOvr>
+    <a:masterClrMapping/>
+  </p:clrMapOvr>
+</p:sld>
+</file>
+
+<file path=ppt/slides/slide7.xml><?xml version="1.0" encoding="utf-8"?>
+<p:sld xmlns:a="http://schemas.openxmlformats.org/drawingml/2006/main" xmlns:r="http://schemas.openxmlformats.org/officeDocument/2006/relationships" xmlns:p="http://schemas.openxmlformats.org/presentationml/2006/main">
+  <p:cSld>
+    <p:spTree>
+      <p:nvGrpSpPr>
+        <p:cNvPr id="1" name=""/>
+        <p:cNvGrpSpPr/>
+        <p:nvPr/>
+      </p:nvGrpSpPr>
+      <p:grpSpPr>
+        <a:xfrm>
+          <a:off x="0" y="0"/>
+          <a:ext cx="0" cy="0"/>
+          <a:chOff x="0" y="0"/>
+          <a:chExt cx="0" cy="0"/>
+        </a:xfrm>
+      </p:grpSpPr>
+      <p:sp>
+        <p:nvSpPr>
+          <p:cNvPr id="2" name="Title 1">
+            <a:extLst>
+              <a:ext uri="{FF2B5EF4-FFF2-40B4-BE49-F238E27FC236}">
+                <a16:creationId xmlns:a16="http://schemas.microsoft.com/office/drawing/2014/main" id="{FF47D404-B269-2470-65CC-952B1763FDCB}"/>
+              </a:ext>
+            </a:extLst>
+          </p:cNvPr>
+          <p:cNvSpPr>
+            <a:spLocks noGrp="1"/>
+          </p:cNvSpPr>
+          <p:nvPr>
+            <p:ph type="title"/>
+          </p:nvPr>
+        </p:nvSpPr>
+        <p:spPr/>
+        <p:txBody>
+          <a:bodyPr/>
+          <a:lstStyle/>
+          <a:p>
+            <a:r>
+              <a:rPr lang="en-US" dirty="0"/>
+              <a:t>Supplemental figures that drill into apiary concentrations.</a:t>
+            </a:r>
+          </a:p>
+        </p:txBody>
+      </p:sp>
+      <p:sp>
+        <p:nvSpPr>
+          <p:cNvPr id="3" name="Content Placeholder 2">
+            <a:extLst>
+              <a:ext uri="{FF2B5EF4-FFF2-40B4-BE49-F238E27FC236}">
+                <a16:creationId xmlns:a16="http://schemas.microsoft.com/office/drawing/2014/main" id="{066505A6-41E4-21C3-9956-1886071D146E}"/>
+              </a:ext>
+            </a:extLst>
+          </p:cNvPr>
+          <p:cNvSpPr>
+            <a:spLocks noGrp="1"/>
+          </p:cNvSpPr>
+          <p:nvPr>
+            <p:ph idx="1"/>
+          </p:nvPr>
+        </p:nvSpPr>
+        <p:spPr/>
+        <p:txBody>
+          <a:bodyPr/>
+          <a:lstStyle/>
+          <a:p>
+            <a:endParaRPr lang="en-US"/>
+          </a:p>
+        </p:txBody>
+      </p:sp>
+    </p:spTree>
+    <p:extLst>
+      <p:ext uri="{BB962C8B-B14F-4D97-AF65-F5344CB8AC3E}">
+        <p14:creationId xmlns:p14="http://schemas.microsoft.com/office/powerpoint/2010/main" val="1754572678"/>
       </p:ext>
     </p:extLst>
   </p:cSld>

</xml_diff>

<commit_message>
stacked land cover plot
</commit_message>
<xml_diff>
--- a/pptx/glinski_bee_matrices.pptx
+++ b/pptx/glinski_bee_matrices.pptx
@@ -14,7 +14,7 @@
     <p:sldId id="265" r:id="rId8"/>
   </p:sldIdLst>
   <p:sldSz cx="12192000" cy="6858000"/>
-  <p:notesSz cx="6858000" cy="9144000"/>
+  <p:notesSz cx="7010400" cy="9236075"/>
   <p:defaultTextStyle>
     <a:defPPr>
       <a:defRPr lang="en-US"/>
@@ -265,7 +265,7 @@
           <a:p>
             <a:fld id="{EABB898F-4C09-408E-8555-5949496D4208}" type="datetimeFigureOut">
               <a:rPr lang="en-US" smtClean="0"/>
-              <a:t>4/10/2023</a:t>
+              <a:t>4/24/2023</a:t>
             </a:fld>
             <a:endParaRPr lang="en-US"/>
           </a:p>
@@ -463,7 +463,7 @@
           <a:p>
             <a:fld id="{EABB898F-4C09-408E-8555-5949496D4208}" type="datetimeFigureOut">
               <a:rPr lang="en-US" smtClean="0"/>
-              <a:t>4/10/2023</a:t>
+              <a:t>4/24/2023</a:t>
             </a:fld>
             <a:endParaRPr lang="en-US"/>
           </a:p>
@@ -671,7 +671,7 @@
           <a:p>
             <a:fld id="{EABB898F-4C09-408E-8555-5949496D4208}" type="datetimeFigureOut">
               <a:rPr lang="en-US" smtClean="0"/>
-              <a:t>4/10/2023</a:t>
+              <a:t>4/24/2023</a:t>
             </a:fld>
             <a:endParaRPr lang="en-US"/>
           </a:p>
@@ -869,7 +869,7 @@
           <a:p>
             <a:fld id="{EABB898F-4C09-408E-8555-5949496D4208}" type="datetimeFigureOut">
               <a:rPr lang="en-US" smtClean="0"/>
-              <a:t>4/10/2023</a:t>
+              <a:t>4/24/2023</a:t>
             </a:fld>
             <a:endParaRPr lang="en-US"/>
           </a:p>
@@ -1144,7 +1144,7 @@
           <a:p>
             <a:fld id="{EABB898F-4C09-408E-8555-5949496D4208}" type="datetimeFigureOut">
               <a:rPr lang="en-US" smtClean="0"/>
-              <a:t>4/10/2023</a:t>
+              <a:t>4/24/2023</a:t>
             </a:fld>
             <a:endParaRPr lang="en-US"/>
           </a:p>
@@ -1409,7 +1409,7 @@
           <a:p>
             <a:fld id="{EABB898F-4C09-408E-8555-5949496D4208}" type="datetimeFigureOut">
               <a:rPr lang="en-US" smtClean="0"/>
-              <a:t>4/10/2023</a:t>
+              <a:t>4/24/2023</a:t>
             </a:fld>
             <a:endParaRPr lang="en-US"/>
           </a:p>
@@ -1821,7 +1821,7 @@
           <a:p>
             <a:fld id="{EABB898F-4C09-408E-8555-5949496D4208}" type="datetimeFigureOut">
               <a:rPr lang="en-US" smtClean="0"/>
-              <a:t>4/10/2023</a:t>
+              <a:t>4/24/2023</a:t>
             </a:fld>
             <a:endParaRPr lang="en-US"/>
           </a:p>
@@ -1962,7 +1962,7 @@
           <a:p>
             <a:fld id="{EABB898F-4C09-408E-8555-5949496D4208}" type="datetimeFigureOut">
               <a:rPr lang="en-US" smtClean="0"/>
-              <a:t>4/10/2023</a:t>
+              <a:t>4/24/2023</a:t>
             </a:fld>
             <a:endParaRPr lang="en-US"/>
           </a:p>
@@ -2075,7 +2075,7 @@
           <a:p>
             <a:fld id="{EABB898F-4C09-408E-8555-5949496D4208}" type="datetimeFigureOut">
               <a:rPr lang="en-US" smtClean="0"/>
-              <a:t>4/10/2023</a:t>
+              <a:t>4/24/2023</a:t>
             </a:fld>
             <a:endParaRPr lang="en-US"/>
           </a:p>
@@ -2386,7 +2386,7 @@
           <a:p>
             <a:fld id="{EABB898F-4C09-408E-8555-5949496D4208}" type="datetimeFigureOut">
               <a:rPr lang="en-US" smtClean="0"/>
-              <a:t>4/10/2023</a:t>
+              <a:t>4/24/2023</a:t>
             </a:fld>
             <a:endParaRPr lang="en-US"/>
           </a:p>
@@ -2674,7 +2674,7 @@
           <a:p>
             <a:fld id="{EABB898F-4C09-408E-8555-5949496D4208}" type="datetimeFigureOut">
               <a:rPr lang="en-US" smtClean="0"/>
-              <a:t>4/10/2023</a:t>
+              <a:t>4/24/2023</a:t>
             </a:fld>
             <a:endParaRPr lang="en-US"/>
           </a:p>
@@ -2915,7 +2915,7 @@
           <a:p>
             <a:fld id="{EABB898F-4C09-408E-8555-5949496D4208}" type="datetimeFigureOut">
               <a:rPr lang="en-US" smtClean="0"/>
-              <a:t>4/10/2023</a:t>
+              <a:t>4/24/2023</a:t>
             </a:fld>
             <a:endParaRPr lang="en-US"/>
           </a:p>
@@ -3419,57 +3419,12 @@
           <a:chExt cx="0" cy="0"/>
         </a:xfrm>
       </p:grpSpPr>
-      <p:sp>
-        <p:nvSpPr>
-          <p:cNvPr id="2" name="Title 1">
-            <a:extLst>
-              <a:ext uri="{FF2B5EF4-FFF2-40B4-BE49-F238E27FC236}">
-                <a16:creationId xmlns:a16="http://schemas.microsoft.com/office/drawing/2014/main" id="{294958C4-0C9B-40B4-59F5-6A323423751B}"/>
-              </a:ext>
-            </a:extLst>
-          </p:cNvPr>
-          <p:cNvSpPr>
-            <a:spLocks noGrp="1"/>
-          </p:cNvSpPr>
-          <p:nvPr>
-            <p:ph type="title"/>
-          </p:nvPr>
-        </p:nvSpPr>
-        <p:spPr>
-          <a:xfrm>
-            <a:off x="979559" y="697828"/>
-            <a:ext cx="3954750" cy="3137200"/>
-          </a:xfrm>
-        </p:spPr>
-        <p:txBody>
-          <a:bodyPr>
-            <a:normAutofit/>
-          </a:bodyPr>
-          <a:lstStyle/>
-          <a:p>
-            <a:r>
-              <a:rPr lang="en-US" sz="1800" dirty="0"/>
-              <a:t>Figure 1. Locations of apiary study sites in central Ohio (1A). A bar chart representing the proportional landscape gradient within a 2 km radius of each apiary (1B).</a:t>
-            </a:r>
-            <a:br>
-              <a:rPr lang="en-US" sz="1800" dirty="0"/>
-            </a:br>
-            <a:br>
-              <a:rPr lang="en-US" sz="1800" dirty="0"/>
-            </a:br>
-            <a:r>
-              <a:rPr lang="en-US" sz="1800" dirty="0"/>
-              <a:t>Alternative map for 1A, and figure for 1B.</a:t>
-            </a:r>
-          </a:p>
-        </p:txBody>
-      </p:sp>
       <p:grpSp>
         <p:nvGrpSpPr>
-          <p:cNvPr id="9" name="Group 8">
-            <a:extLst>
-              <a:ext uri="{FF2B5EF4-FFF2-40B4-BE49-F238E27FC236}">
-                <a16:creationId xmlns:a16="http://schemas.microsoft.com/office/drawing/2014/main" id="{83868C4F-1689-8E5A-28FE-1366B1BF7833}"/>
+          <p:cNvPr id="6" name="Group 5">
+            <a:extLst>
+              <a:ext uri="{FF2B5EF4-FFF2-40B4-BE49-F238E27FC236}">
+                <a16:creationId xmlns:a16="http://schemas.microsoft.com/office/drawing/2014/main" id="{5F89831D-684D-C78F-63FE-554B9B9FFAFC}"/>
               </a:ext>
             </a:extLst>
           </p:cNvPr>
@@ -3484,174 +3439,234 @@
             <a:chExt cx="5350792" cy="6857999"/>
           </a:xfrm>
         </p:grpSpPr>
-        <p:grpSp>
-          <p:nvGrpSpPr>
-            <p:cNvPr id="6" name="Group 5">
+        <p:pic>
+          <p:nvPicPr>
+            <p:cNvPr id="4" name="Picture 3">
               <a:extLst>
                 <a:ext uri="{FF2B5EF4-FFF2-40B4-BE49-F238E27FC236}">
-                  <a16:creationId xmlns:a16="http://schemas.microsoft.com/office/drawing/2014/main" id="{5F89831D-684D-C78F-63FE-554B9B9FFAFC}"/>
+                  <a16:creationId xmlns:a16="http://schemas.microsoft.com/office/drawing/2014/main" id="{FDACCF71-057B-89CC-6835-CD5F69941F2E}"/>
                 </a:ext>
               </a:extLst>
             </p:cNvPr>
-            <p:cNvGrpSpPr/>
+            <p:cNvPicPr>
+              <a:picLocks noChangeAspect="1"/>
+            </p:cNvPicPr>
             <p:nvPr/>
-          </p:nvGrpSpPr>
-          <p:grpSpPr>
-            <a:xfrm>
-              <a:off x="6841208" y="19250"/>
-              <a:ext cx="5350792" cy="6857999"/>
-              <a:chOff x="6841208" y="19250"/>
-              <a:chExt cx="5350792" cy="6857999"/>
-            </a:xfrm>
-          </p:grpSpPr>
-          <p:pic>
-            <p:nvPicPr>
-              <p:cNvPr id="4" name="Picture 3">
-                <a:extLst>
-                  <a:ext uri="{FF2B5EF4-FFF2-40B4-BE49-F238E27FC236}">
-                    <a16:creationId xmlns:a16="http://schemas.microsoft.com/office/drawing/2014/main" id="{FDACCF71-057B-89CC-6835-CD5F69941F2E}"/>
-                  </a:ext>
-                </a:extLst>
-              </p:cNvPr>
-              <p:cNvPicPr>
-                <a:picLocks noChangeAspect="1"/>
-              </p:cNvPicPr>
-              <p:nvPr/>
-            </p:nvPicPr>
-            <p:blipFill>
-              <a:blip r:embed="rId2">
-                <a:extLst>
-                  <a:ext uri="{28A0092B-C50C-407E-A947-70E740481C1C}">
-                    <a14:useLocalDpi xmlns:a14="http://schemas.microsoft.com/office/drawing/2010/main" val="0"/>
-                  </a:ext>
-                </a:extLst>
-              </a:blip>
-              <a:srcRect/>
-              <a:stretch>
-                <a:fillRect/>
-              </a:stretch>
-            </p:blipFill>
-            <p:spPr bwMode="auto">
-              <a:xfrm>
-                <a:off x="6841208" y="3410426"/>
-                <a:ext cx="5350792" cy="3466823"/>
-              </a:xfrm>
-              <a:prstGeom prst="rect">
-                <a:avLst/>
-              </a:prstGeom>
-              <a:noFill/>
-            </p:spPr>
-          </p:pic>
-          <p:pic>
-            <p:nvPicPr>
-              <p:cNvPr id="5" name="Picture 4">
-                <a:extLst>
-                  <a:ext uri="{FF2B5EF4-FFF2-40B4-BE49-F238E27FC236}">
-                    <a16:creationId xmlns:a16="http://schemas.microsoft.com/office/drawing/2014/main" id="{1E30E3FE-9347-1C40-EF97-DBEDDC9CF10E}"/>
-                  </a:ext>
-                </a:extLst>
-              </p:cNvPr>
-              <p:cNvPicPr>
-                <a:picLocks noChangeAspect="1"/>
-              </p:cNvPicPr>
-              <p:nvPr/>
-            </p:nvPicPr>
-            <p:blipFill>
-              <a:blip r:embed="rId3">
-                <a:extLst>
-                  <a:ext uri="{28A0092B-C50C-407E-A947-70E740481C1C}">
-                    <a14:useLocalDpi xmlns:a14="http://schemas.microsoft.com/office/drawing/2010/main" val="0"/>
-                  </a:ext>
-                </a:extLst>
-              </a:blip>
-              <a:srcRect/>
-              <a:stretch>
-                <a:fillRect/>
-              </a:stretch>
-            </p:blipFill>
-            <p:spPr bwMode="auto">
-              <a:xfrm>
-                <a:off x="7295147" y="19250"/>
-                <a:ext cx="4091539" cy="3418654"/>
-              </a:xfrm>
-              <a:prstGeom prst="rect">
-                <a:avLst/>
-              </a:prstGeom>
-              <a:noFill/>
-            </p:spPr>
-          </p:pic>
-        </p:grpSp>
-        <p:sp>
-          <p:nvSpPr>
-            <p:cNvPr id="7" name="TextBox 6">
+          </p:nvPicPr>
+          <p:blipFill>
+            <a:blip r:embed="rId2">
               <a:extLst>
-                <a:ext uri="{FF2B5EF4-FFF2-40B4-BE49-F238E27FC236}">
-                  <a16:creationId xmlns:a16="http://schemas.microsoft.com/office/drawing/2014/main" id="{5B293E70-7F9C-969D-2F37-B0B422501D98}"/>
+                <a:ext uri="{28A0092B-C50C-407E-A947-70E740481C1C}">
+                  <a14:useLocalDpi xmlns:a14="http://schemas.microsoft.com/office/drawing/2010/main" val="0"/>
                 </a:ext>
               </a:extLst>
-            </p:cNvPr>
-            <p:cNvSpPr txBox="1"/>
-            <p:nvPr/>
-          </p:nvSpPr>
-          <p:spPr>
+            </a:blip>
+            <a:srcRect/>
+            <a:stretch>
+              <a:fillRect/>
+            </a:stretch>
+          </p:blipFill>
+          <p:spPr bwMode="auto">
             <a:xfrm>
-              <a:off x="6841208" y="19250"/>
-              <a:ext cx="603849" cy="369332"/>
+              <a:off x="6841208" y="3410426"/>
+              <a:ext cx="5350792" cy="3466823"/>
             </a:xfrm>
             <a:prstGeom prst="rect">
               <a:avLst/>
             </a:prstGeom>
             <a:noFill/>
           </p:spPr>
-          <p:txBody>
-            <a:bodyPr wrap="square" rtlCol="0">
-              <a:spAutoFit/>
-            </a:bodyPr>
-            <a:lstStyle/>
-            <a:p>
-              <a:r>
-                <a:rPr lang="en-US" b="1" dirty="0"/>
-                <a:t>A</a:t>
-              </a:r>
-            </a:p>
-          </p:txBody>
-        </p:sp>
-        <p:sp>
-          <p:nvSpPr>
-            <p:cNvPr id="8" name="TextBox 7">
+        </p:pic>
+        <p:pic>
+          <p:nvPicPr>
+            <p:cNvPr id="5" name="Picture 4">
               <a:extLst>
                 <a:ext uri="{FF2B5EF4-FFF2-40B4-BE49-F238E27FC236}">
-                  <a16:creationId xmlns:a16="http://schemas.microsoft.com/office/drawing/2014/main" id="{33EBC2D3-B238-574B-B849-D0968ECE4BE1}"/>
+                  <a16:creationId xmlns:a16="http://schemas.microsoft.com/office/drawing/2014/main" id="{1E30E3FE-9347-1C40-EF97-DBEDDC9CF10E}"/>
                 </a:ext>
               </a:extLst>
             </p:cNvPr>
-            <p:cNvSpPr txBox="1"/>
+            <p:cNvPicPr>
+              <a:picLocks noChangeAspect="1"/>
+            </p:cNvPicPr>
             <p:nvPr/>
-          </p:nvSpPr>
-          <p:spPr>
+          </p:nvPicPr>
+          <p:blipFill>
+            <a:blip r:embed="rId3">
+              <a:extLst>
+                <a:ext uri="{28A0092B-C50C-407E-A947-70E740481C1C}">
+                  <a14:useLocalDpi xmlns:a14="http://schemas.microsoft.com/office/drawing/2010/main" val="0"/>
+                </a:ext>
+              </a:extLst>
+            </a:blip>
+            <a:srcRect/>
+            <a:stretch>
+              <a:fillRect/>
+            </a:stretch>
+          </p:blipFill>
+          <p:spPr bwMode="auto">
             <a:xfrm>
-              <a:off x="6841208" y="3595092"/>
-              <a:ext cx="603849" cy="369332"/>
+              <a:off x="7295147" y="19250"/>
+              <a:ext cx="4091539" cy="3418654"/>
             </a:xfrm>
             <a:prstGeom prst="rect">
               <a:avLst/>
             </a:prstGeom>
             <a:noFill/>
           </p:spPr>
-          <p:txBody>
-            <a:bodyPr wrap="square" rtlCol="0">
-              <a:spAutoFit/>
-            </a:bodyPr>
-            <a:lstStyle/>
-            <a:p>
-              <a:r>
-                <a:rPr lang="en-US" b="1" dirty="0"/>
-                <a:t>B</a:t>
-              </a:r>
-            </a:p>
-          </p:txBody>
-        </p:sp>
+        </p:pic>
       </p:grpSp>
+      <p:pic>
+        <p:nvPicPr>
+          <p:cNvPr id="10" name="Picture 9" descr="Chart, bar chart&#10;&#10;Description automatically generated">
+            <a:extLst>
+              <a:ext uri="{FF2B5EF4-FFF2-40B4-BE49-F238E27FC236}">
+                <a16:creationId xmlns:a16="http://schemas.microsoft.com/office/drawing/2014/main" id="{7A68BF14-B795-E89A-64B4-236BF7084F6F}"/>
+              </a:ext>
+            </a:extLst>
+          </p:cNvPr>
+          <p:cNvPicPr>
+            <a:picLocks noChangeAspect="1"/>
+          </p:cNvPicPr>
+          <p:nvPr/>
+        </p:nvPicPr>
+        <p:blipFill>
+          <a:blip r:embed="rId4">
+            <a:extLst>
+              <a:ext uri="{28A0092B-C50C-407E-A947-70E740481C1C}">
+                <a14:useLocalDpi xmlns:a14="http://schemas.microsoft.com/office/drawing/2010/main" val="0"/>
+              </a:ext>
+            </a:extLst>
+          </a:blip>
+          <a:stretch>
+            <a:fillRect/>
+          </a:stretch>
+        </p:blipFill>
+        <p:spPr>
+          <a:xfrm>
+            <a:off x="6841208" y="3255609"/>
+            <a:ext cx="5002860" cy="3573471"/>
+          </a:xfrm>
+          <a:prstGeom prst="rect">
+            <a:avLst/>
+          </a:prstGeom>
+        </p:spPr>
+      </p:pic>
+      <p:sp>
+        <p:nvSpPr>
+          <p:cNvPr id="2" name="Title 1">
+            <a:extLst>
+              <a:ext uri="{FF2B5EF4-FFF2-40B4-BE49-F238E27FC236}">
+                <a16:creationId xmlns:a16="http://schemas.microsoft.com/office/drawing/2014/main" id="{294958C4-0C9B-40B4-59F5-6A323423751B}"/>
+              </a:ext>
+            </a:extLst>
+          </p:cNvPr>
+          <p:cNvSpPr>
+            <a:spLocks noGrp="1"/>
+          </p:cNvSpPr>
+          <p:nvPr>
+            <p:ph type="title"/>
+          </p:nvPr>
+        </p:nvSpPr>
+        <p:spPr>
+          <a:xfrm>
+            <a:off x="979559" y="697828"/>
+            <a:ext cx="3954750" cy="3137200"/>
+          </a:xfrm>
+        </p:spPr>
+        <p:txBody>
+          <a:bodyPr>
+            <a:normAutofit/>
+          </a:bodyPr>
+          <a:lstStyle/>
+          <a:p>
+            <a:r>
+              <a:rPr lang="en-US" sz="1800" dirty="0"/>
+              <a:t>Figure 1. Locations of apiary study sites in central Ohio (1A). A bar chart representing the proportional landscape gradient within a 2 km radius of each apiary (1B).</a:t>
+            </a:r>
+            <a:br>
+              <a:rPr lang="en-US" sz="1800" dirty="0"/>
+            </a:br>
+            <a:br>
+              <a:rPr lang="en-US" sz="1800" dirty="0"/>
+            </a:br>
+            <a:r>
+              <a:rPr lang="en-US" sz="1800" dirty="0"/>
+              <a:t>Alternative map for 1A, and figure for 1B.</a:t>
+            </a:r>
+          </a:p>
+        </p:txBody>
+      </p:sp>
+      <p:sp>
+        <p:nvSpPr>
+          <p:cNvPr id="7" name="TextBox 6">
+            <a:extLst>
+              <a:ext uri="{FF2B5EF4-FFF2-40B4-BE49-F238E27FC236}">
+                <a16:creationId xmlns:a16="http://schemas.microsoft.com/office/drawing/2014/main" id="{5B293E70-7F9C-969D-2F37-B0B422501D98}"/>
+              </a:ext>
+            </a:extLst>
+          </p:cNvPr>
+          <p:cNvSpPr txBox="1"/>
+          <p:nvPr/>
+        </p:nvSpPr>
+        <p:spPr>
+          <a:xfrm>
+            <a:off x="6841208" y="19250"/>
+            <a:ext cx="603849" cy="369332"/>
+          </a:xfrm>
+          <a:prstGeom prst="rect">
+            <a:avLst/>
+          </a:prstGeom>
+          <a:noFill/>
+        </p:spPr>
+        <p:txBody>
+          <a:bodyPr wrap="square" rtlCol="0">
+            <a:spAutoFit/>
+          </a:bodyPr>
+          <a:lstStyle/>
+          <a:p>
+            <a:r>
+              <a:rPr lang="en-US" b="1" dirty="0"/>
+              <a:t>A</a:t>
+            </a:r>
+          </a:p>
+        </p:txBody>
+      </p:sp>
+      <p:sp>
+        <p:nvSpPr>
+          <p:cNvPr id="8" name="TextBox 7">
+            <a:extLst>
+              <a:ext uri="{FF2B5EF4-FFF2-40B4-BE49-F238E27FC236}">
+                <a16:creationId xmlns:a16="http://schemas.microsoft.com/office/drawing/2014/main" id="{33EBC2D3-B238-574B-B849-D0968ECE4BE1}"/>
+              </a:ext>
+            </a:extLst>
+          </p:cNvPr>
+          <p:cNvSpPr txBox="1"/>
+          <p:nvPr/>
+        </p:nvSpPr>
+        <p:spPr>
+          <a:xfrm>
+            <a:off x="6841208" y="3595092"/>
+            <a:ext cx="603849" cy="369332"/>
+          </a:xfrm>
+          <a:prstGeom prst="rect">
+            <a:avLst/>
+          </a:prstGeom>
+          <a:noFill/>
+        </p:spPr>
+        <p:txBody>
+          <a:bodyPr wrap="square" rtlCol="0">
+            <a:spAutoFit/>
+          </a:bodyPr>
+          <a:lstStyle/>
+          <a:p>
+            <a:r>
+              <a:rPr lang="en-US" b="1" dirty="0"/>
+              <a:t>B</a:t>
+            </a:r>
+          </a:p>
+        </p:txBody>
+      </p:sp>
     </p:spTree>
     <p:extLst>
       <p:ext uri="{BB962C8B-B14F-4D97-AF65-F5344CB8AC3E}">
@@ -4085,10 +4100,10 @@
       </p:sp>
       <p:pic>
         <p:nvPicPr>
-          <p:cNvPr id="5" name="Picture 4">
-            <a:extLst>
-              <a:ext uri="{FF2B5EF4-FFF2-40B4-BE49-F238E27FC236}">
-                <a16:creationId xmlns:a16="http://schemas.microsoft.com/office/drawing/2014/main" id="{DEEACE56-9B01-D123-CCBB-26FCE6D573E5}"/>
+          <p:cNvPr id="4" name="Picture 3" descr="Chart, line chart&#10;&#10;Description automatically generated">
+            <a:extLst>
+              <a:ext uri="{FF2B5EF4-FFF2-40B4-BE49-F238E27FC236}">
+                <a16:creationId xmlns:a16="http://schemas.microsoft.com/office/drawing/2014/main" id="{7828F792-C71A-C874-6DDB-DBB3BBDDEBAB}"/>
               </a:ext>
             </a:extLst>
           </p:cNvPr>
@@ -4098,45 +4113,21 @@
           <p:nvPr/>
         </p:nvPicPr>
         <p:blipFill>
-          <a:blip r:embed="rId2"/>
+          <a:blip r:embed="rId2">
+            <a:extLst>
+              <a:ext uri="{28A0092B-C50C-407E-A947-70E740481C1C}">
+                <a14:useLocalDpi xmlns:a14="http://schemas.microsoft.com/office/drawing/2010/main" val="0"/>
+              </a:ext>
+            </a:extLst>
+          </a:blip>
           <a:stretch>
             <a:fillRect/>
           </a:stretch>
         </p:blipFill>
         <p:spPr>
           <a:xfrm>
-            <a:off x="0" y="1457864"/>
-            <a:ext cx="6316706" cy="5400135"/>
-          </a:xfrm>
-          <a:prstGeom prst="rect">
-            <a:avLst/>
-          </a:prstGeom>
-        </p:spPr>
-      </p:pic>
-      <p:pic>
-        <p:nvPicPr>
-          <p:cNvPr id="7" name="Picture 6">
-            <a:extLst>
-              <a:ext uri="{FF2B5EF4-FFF2-40B4-BE49-F238E27FC236}">
-                <a16:creationId xmlns:a16="http://schemas.microsoft.com/office/drawing/2014/main" id="{B54F64E0-1179-9EF9-19E0-4F7845AA4FCC}"/>
-              </a:ext>
-            </a:extLst>
-          </p:cNvPr>
-          <p:cNvPicPr>
-            <a:picLocks noChangeAspect="1"/>
-          </p:cNvPicPr>
-          <p:nvPr/>
-        </p:nvPicPr>
-        <p:blipFill>
-          <a:blip r:embed="rId3"/>
-          <a:stretch>
-            <a:fillRect/>
-          </a:stretch>
-        </p:blipFill>
-        <p:spPr>
-          <a:xfrm>
-            <a:off x="5594354" y="1552756"/>
-            <a:ext cx="6643798" cy="5305244"/>
+            <a:off x="2169268" y="1142999"/>
+            <a:ext cx="7127132" cy="5090809"/>
           </a:xfrm>
           <a:prstGeom prst="rect">
             <a:avLst/>

</xml_diff>